<commit_message>
Last Update 03-09-2018 12:11:15.51
</commit_message>
<xml_diff>
--- a/Slides/Unit 1/GE8151-U1-1-Algorithms.pptx
+++ b/Slides/Unit 1/GE8151-U1-1-Algorithms.pptx
@@ -5,7 +5,7 @@
     <p:sldMasterId id="2147483648" r:id="rId1"/>
   </p:sldMasterIdLst>
   <p:notesMasterIdLst>
-    <p:notesMasterId r:id="rId17"/>
+    <p:notesMasterId r:id="rId18"/>
   </p:notesMasterIdLst>
   <p:sldIdLst>
     <p:sldId id="256" r:id="rId2"/>
@@ -22,7 +22,8 @@
     <p:sldId id="281" r:id="rId13"/>
     <p:sldId id="285" r:id="rId14"/>
     <p:sldId id="286" r:id="rId15"/>
-    <p:sldId id="272" r:id="rId16"/>
+    <p:sldId id="287" r:id="rId16"/>
+    <p:sldId id="272" r:id="rId17"/>
   </p:sldIdLst>
   <p:sldSz cx="9144000" cy="6858000" type="screen4x3"/>
   <p:notesSz cx="6858000" cy="9144000"/>
@@ -3527,23 +3528,7 @@
             </a:br>
             <a:r>
               <a:rPr lang="en-IN" sz="3500" dirty="0" smtClean="0"/>
-              <a:t>Problem </a:t>
-            </a:r>
-            <a:r>
-              <a:rPr lang="en-IN" sz="3500" dirty="0" smtClean="0"/>
-              <a:t>Solving </a:t>
-            </a:r>
-            <a:r>
-              <a:rPr lang="en-IN" sz="3500" dirty="0" smtClean="0"/>
-              <a:t> </a:t>
-            </a:r>
-            <a:r>
-              <a:rPr lang="en-IN" sz="3500" dirty="0" smtClean="0"/>
-              <a:t>and Python </a:t>
-            </a:r>
-            <a:r>
-              <a:rPr lang="en-IN" sz="3500" dirty="0" smtClean="0"/>
-              <a:t>Programming</a:t>
+              <a:t>Problem Solving  and Python Programming</a:t>
             </a:r>
             <a:endParaRPr lang="en-US" sz="3500" dirty="0"/>
           </a:p>
@@ -3909,7 +3894,6 @@
               <a:rPr lang="en-IN" dirty="0" smtClean="0"/>
               <a:t>They are important in other domains (computational biology, economics, ecology, communications, physics). </a:t>
             </a:r>
-            <a:endParaRPr lang="en-IN" dirty="0" smtClean="0"/>
           </a:p>
           <a:p>
             <a:r>
@@ -4070,11 +4054,7 @@
             </a:br>
             <a:r>
               <a:rPr lang="en-IN" sz="3300" b="1" dirty="0" smtClean="0"/>
-              <a:t>T</a:t>
-            </a:r>
-            <a:r>
-              <a:rPr lang="en-IN" sz="3300" b="1" dirty="0" smtClean="0"/>
-              <a:t>o Compute addition of Two numbers </a:t>
+              <a:t>To Compute addition of Two numbers </a:t>
             </a:r>
             <a:endParaRPr lang="en-US" sz="3300" b="1" dirty="0"/>
           </a:p>
@@ -4213,11 +4193,7 @@
             </a:br>
             <a:r>
               <a:rPr lang="en-US" sz="3900" b="1" i="1" dirty="0" smtClean="0"/>
-              <a:t>[</a:t>
-            </a:r>
-            <a:r>
-              <a:rPr lang="en-US" sz="3900" b="1" i="1" dirty="0" smtClean="0"/>
-              <a:t>To Toast a Bread]</a:t>
+              <a:t>[To Toast a Bread]</a:t>
             </a:r>
             <a:endParaRPr lang="en-US" sz="3900" b="1" i="1" dirty="0"/>
           </a:p>
@@ -4249,15 +4225,7 @@
             </a:r>
             <a:r>
               <a:rPr lang="en-US" i="1" dirty="0" smtClean="0"/>
-              <a:t> </a:t>
-            </a:r>
-            <a:r>
-              <a:rPr lang="en-US" i="1" dirty="0" smtClean="0"/>
-              <a:t>Grab a loaf of </a:t>
-            </a:r>
-            <a:r>
-              <a:rPr lang="en-US" i="1" dirty="0" smtClean="0"/>
-              <a:t>bread and pick one slice.</a:t>
+              <a:t> Grab a loaf of bread and pick one slice.</a:t>
             </a:r>
             <a:endParaRPr lang="en-US" dirty="0" smtClean="0"/>
           </a:p>
@@ -4267,23 +4235,11 @@
             </a:pPr>
             <a:r>
               <a:rPr lang="en-US" b="1" i="1" dirty="0" smtClean="0"/>
-              <a:t>Step </a:t>
-            </a:r>
-            <a:r>
-              <a:rPr lang="en-US" b="1" i="1" dirty="0" smtClean="0"/>
-              <a:t>2: </a:t>
+              <a:t>Step 2: </a:t>
             </a:r>
             <a:r>
               <a:rPr lang="en-US" i="1" dirty="0" smtClean="0"/>
-              <a:t>Get a </a:t>
-            </a:r>
-            <a:r>
-              <a:rPr lang="en-US" i="1" dirty="0" smtClean="0"/>
-              <a:t>frying pan </a:t>
-            </a:r>
-            <a:r>
-              <a:rPr lang="en-US" i="1" dirty="0" smtClean="0"/>
-              <a:t>and place it on the stove let it heat.</a:t>
+              <a:t>Get a frying pan and place it on the stove let it heat.</a:t>
             </a:r>
             <a:endParaRPr lang="en-US" dirty="0" smtClean="0"/>
           </a:p>
@@ -4293,23 +4249,11 @@
             </a:pPr>
             <a:r>
               <a:rPr lang="en-US" b="1" i="1" dirty="0" smtClean="0"/>
-              <a:t>Step </a:t>
-            </a:r>
-            <a:r>
-              <a:rPr lang="en-US" b="1" i="1" dirty="0" smtClean="0"/>
-              <a:t>3:</a:t>
+              <a:t>Step 3:</a:t>
             </a:r>
             <a:r>
               <a:rPr lang="en-US" i="1" dirty="0" smtClean="0"/>
-              <a:t> </a:t>
-            </a:r>
-            <a:r>
-              <a:rPr lang="en-US" i="1" dirty="0" smtClean="0"/>
-              <a:t>Pour some oil on the pan and wait for oil </a:t>
-            </a:r>
-            <a:r>
-              <a:rPr lang="en-US" i="1" dirty="0" smtClean="0"/>
-              <a:t>get some heat.</a:t>
+              <a:t> Pour some oil on the pan and wait for oil get some heat.</a:t>
             </a:r>
             <a:endParaRPr lang="en-US" dirty="0" smtClean="0"/>
           </a:p>
@@ -4319,19 +4263,11 @@
             </a:pPr>
             <a:r>
               <a:rPr lang="en-US" b="1" i="1" dirty="0" smtClean="0"/>
-              <a:t>Step </a:t>
-            </a:r>
-            <a:r>
-              <a:rPr lang="en-US" b="1" i="1" dirty="0" smtClean="0"/>
-              <a:t>4:</a:t>
+              <a:t>Step 4:</a:t>
             </a:r>
             <a:r>
               <a:rPr lang="en-US" i="1" dirty="0" smtClean="0"/>
-              <a:t> </a:t>
-            </a:r>
-            <a:r>
-              <a:rPr lang="en-US" i="1" dirty="0" smtClean="0"/>
-              <a:t>Put a slice on the pan and roast until it become brown in shade.</a:t>
+              <a:t> Put a slice on the pan and roast until it become brown in shade.</a:t>
             </a:r>
             <a:endParaRPr lang="en-US" dirty="0" smtClean="0"/>
           </a:p>
@@ -4341,23 +4277,11 @@
             </a:pPr>
             <a:r>
               <a:rPr lang="en-US" b="1" i="1" dirty="0" smtClean="0"/>
-              <a:t>Step </a:t>
-            </a:r>
-            <a:r>
-              <a:rPr lang="en-US" b="1" i="1" dirty="0" smtClean="0"/>
-              <a:t>5:</a:t>
+              <a:t>Step 5:</a:t>
             </a:r>
             <a:r>
               <a:rPr lang="en-US" i="1" dirty="0" smtClean="0"/>
-              <a:t> </a:t>
-            </a:r>
-            <a:r>
-              <a:rPr lang="en-US" i="1" dirty="0" smtClean="0"/>
-              <a:t>Turn the slice and </a:t>
-            </a:r>
-            <a:r>
-              <a:rPr lang="en-US" i="1" dirty="0" smtClean="0"/>
-              <a:t>repeat Step 4.</a:t>
+              <a:t> Turn the slice and repeat Step 4.</a:t>
             </a:r>
             <a:endParaRPr lang="en-US" dirty="0" smtClean="0"/>
           </a:p>
@@ -4367,19 +4291,11 @@
             </a:pPr>
             <a:r>
               <a:rPr lang="en-US" b="1" i="1" dirty="0" smtClean="0"/>
-              <a:t>Step </a:t>
-            </a:r>
-            <a:r>
-              <a:rPr lang="en-US" b="1" i="1" dirty="0" smtClean="0"/>
-              <a:t>6:</a:t>
+              <a:t>Step 6:</a:t>
             </a:r>
             <a:r>
               <a:rPr lang="en-US" i="1" dirty="0" smtClean="0"/>
-              <a:t> </a:t>
-            </a:r>
-            <a:r>
-              <a:rPr lang="en-US" i="1" dirty="0" smtClean="0"/>
-              <a:t>Get the toasted bread from the pan and serve it.</a:t>
+              <a:t> Get the toasted bread from the pan and serve it.</a:t>
             </a:r>
             <a:endParaRPr lang="en-US" dirty="0" smtClean="0"/>
           </a:p>
@@ -4389,19 +4305,11 @@
             </a:pPr>
             <a:r>
               <a:rPr lang="en-US" b="1" i="1" dirty="0" smtClean="0"/>
-              <a:t>Step </a:t>
-            </a:r>
-            <a:r>
-              <a:rPr lang="en-US" b="1" i="1" dirty="0" smtClean="0"/>
-              <a:t>7:</a:t>
+              <a:t>Step 7:</a:t>
             </a:r>
             <a:r>
               <a:rPr lang="en-US" i="1" dirty="0" smtClean="0"/>
-              <a:t> </a:t>
-            </a:r>
-            <a:r>
-              <a:rPr lang="en-US" i="1" dirty="0" smtClean="0"/>
-              <a:t>Turn off the heat source.</a:t>
+              <a:t> Turn off the heat source.</a:t>
             </a:r>
             <a:endParaRPr lang="en-US" dirty="0" smtClean="0"/>
           </a:p>
@@ -4422,6 +4330,122 @@
 </file>
 
 <file path=ppt/slides/slide15.xml><?xml version="1.0" encoding="utf-8"?>
+<p:sld xmlns:a="http://schemas.openxmlformats.org/drawingml/2006/main" xmlns:r="http://schemas.openxmlformats.org/officeDocument/2006/relationships" xmlns:p="http://schemas.openxmlformats.org/presentationml/2006/main">
+  <p:cSld>
+    <p:spTree>
+      <p:nvGrpSpPr>
+        <p:cNvPr id="1" name=""/>
+        <p:cNvGrpSpPr/>
+        <p:nvPr/>
+      </p:nvGrpSpPr>
+      <p:grpSpPr>
+        <a:xfrm>
+          <a:off x="0" y="0"/>
+          <a:ext cx="0" cy="0"/>
+          <a:chOff x="0" y="0"/>
+          <a:chExt cx="0" cy="0"/>
+        </a:xfrm>
+      </p:grpSpPr>
+      <p:sp>
+        <p:nvSpPr>
+          <p:cNvPr id="2" name="Title 1"/>
+          <p:cNvSpPr>
+            <a:spLocks noGrp="1"/>
+          </p:cNvSpPr>
+          <p:nvPr>
+            <p:ph type="title"/>
+          </p:nvPr>
+        </p:nvSpPr>
+        <p:spPr/>
+        <p:txBody>
+          <a:bodyPr/>
+          <a:lstStyle/>
+          <a:p>
+            <a:r>
+              <a:rPr lang="en-IN" dirty="0" smtClean="0"/>
+              <a:t>Task </a:t>
+            </a:r>
+            <a:endParaRPr lang="en-US" dirty="0"/>
+          </a:p>
+        </p:txBody>
+      </p:sp>
+      <p:sp>
+        <p:nvSpPr>
+          <p:cNvPr id="3" name="Content Placeholder 2"/>
+          <p:cNvSpPr>
+            <a:spLocks noGrp="1"/>
+          </p:cNvSpPr>
+          <p:nvPr>
+            <p:ph idx="1"/>
+          </p:nvPr>
+        </p:nvSpPr>
+        <p:spPr/>
+        <p:txBody>
+          <a:bodyPr/>
+          <a:lstStyle/>
+          <a:p>
+            <a:r>
+              <a:rPr lang="en-IN" dirty="0" smtClean="0"/>
+              <a:t>Create simple algorithms for following</a:t>
+            </a:r>
+          </a:p>
+          <a:p>
+            <a:pPr lvl="1"/>
+            <a:r>
+              <a:rPr lang="en-IN" dirty="0" smtClean="0"/>
+              <a:t>Sum of 3 numbers.</a:t>
+            </a:r>
+          </a:p>
+          <a:p>
+            <a:pPr lvl="1"/>
+            <a:r>
+              <a:rPr lang="en-IN" dirty="0" smtClean="0"/>
+              <a:t>Finding square of an number</a:t>
+            </a:r>
+            <a:r>
+              <a:rPr lang="en-IN" dirty="0" smtClean="0"/>
+              <a:t>.</a:t>
+            </a:r>
+          </a:p>
+          <a:p>
+            <a:pPr lvl="1"/>
+            <a:r>
+              <a:rPr lang="en-IN" dirty="0" smtClean="0"/>
+              <a:t>To find greatest among 2 numbers.</a:t>
+            </a:r>
+          </a:p>
+          <a:p>
+            <a:pPr lvl="1"/>
+            <a:r>
+              <a:rPr lang="en-IN" dirty="0" smtClean="0"/>
+              <a:t>To find greatest among 3 numbers.</a:t>
+            </a:r>
+          </a:p>
+          <a:p>
+            <a:pPr lvl="1"/>
+            <a:r>
+              <a:rPr lang="en-IN" dirty="0" smtClean="0"/>
+              <a:t>Print number from 1 to 5.</a:t>
+            </a:r>
+          </a:p>
+          <a:p>
+            <a:pPr lvl="1"/>
+            <a:r>
+              <a:rPr lang="en-IN" dirty="0" smtClean="0"/>
+              <a:t>Sum of a numbers from 1 to limit given by user.</a:t>
+            </a:r>
+          </a:p>
+        </p:txBody>
+      </p:sp>
+    </p:spTree>
+  </p:cSld>
+  <p:clrMapOvr>
+    <a:masterClrMapping/>
+  </p:clrMapOvr>
+</p:sld>
+</file>
+
+<file path=ppt/slides/slide16.xml><?xml version="1.0" encoding="utf-8"?>
 <p:sld xmlns:a="http://schemas.openxmlformats.org/drawingml/2006/main" xmlns:r="http://schemas.openxmlformats.org/officeDocument/2006/relationships" xmlns:p="http://schemas.openxmlformats.org/presentationml/2006/main">
   <p:cSld>
     <p:spTree>
@@ -4856,48 +4880,27 @@
           <a:p>
             <a:r>
               <a:rPr lang="en-US" dirty="0" smtClean="0"/>
-              <a:t>UNIT​ ​I​ </a:t>
-            </a:r>
+              <a:t>UNIT​ ​I​ ​</a:t>
+            </a:r>
+          </a:p>
+          <a:p>
+            <a:pPr lvl="1"/>
             <a:r>
               <a:rPr lang="en-US" dirty="0" smtClean="0"/>
-              <a:t>​</a:t>
+              <a:t>ALGORITHMIC​ ​PROBLEM​ ​SOLVING </a:t>
+            </a:r>
+          </a:p>
+          <a:p>
+            <a:r>
+              <a:rPr lang="en-US" dirty="0" smtClean="0"/>
+              <a:t>UNIT​ ​II​ ​</a:t>
             </a:r>
           </a:p>
           <a:p>
             <a:pPr lvl="1"/>
             <a:r>
               <a:rPr lang="en-US" dirty="0" smtClean="0"/>
-              <a:t>ALGORITHMIC</a:t>
-            </a:r>
-            <a:r>
-              <a:rPr lang="en-US" dirty="0" smtClean="0"/>
-              <a:t>​ ​PROBLEM​ ​SOLVING </a:t>
-            </a:r>
-            <a:endParaRPr lang="en-US" dirty="0" smtClean="0"/>
-          </a:p>
-          <a:p>
-            <a:r>
-              <a:rPr lang="en-US" dirty="0" smtClean="0"/>
-              <a:t>UNIT​ ​II​ </a:t>
-            </a:r>
-            <a:r>
-              <a:rPr lang="en-US" dirty="0" smtClean="0"/>
-              <a:t>​</a:t>
-            </a:r>
-          </a:p>
-          <a:p>
-            <a:pPr lvl="1"/>
-            <a:r>
-              <a:rPr lang="en-US" dirty="0" smtClean="0"/>
-              <a:t>DATA</a:t>
-            </a:r>
-            <a:r>
-              <a:rPr lang="en-US" dirty="0" smtClean="0"/>
-              <a:t>,​ ​EXPRESSIONS,​ ​</a:t>
-            </a:r>
-            <a:r>
-              <a:rPr lang="en-US" dirty="0" smtClean="0"/>
-              <a:t>STATEMENTS</a:t>
+              <a:t>DATA,​ ​EXPRESSIONS,​ ​STATEMENTS</a:t>
             </a:r>
           </a:p>
           <a:p>
@@ -4905,40 +4908,25 @@
               <a:rPr lang="en-US" dirty="0" smtClean="0"/>
               <a:t>UNIT​ ​III​ </a:t>
             </a:r>
-            <a:endParaRPr lang="en-US" dirty="0" smtClean="0"/>
           </a:p>
           <a:p>
             <a:pPr lvl="1"/>
             <a:r>
               <a:rPr lang="en-US" dirty="0" smtClean="0"/>
-              <a:t>​</a:t>
-            </a:r>
-            <a:r>
-              <a:rPr lang="en-US" dirty="0" smtClean="0"/>
-              <a:t>CONTROL​ ​FLOW,​ ​FUNCTIONS </a:t>
-            </a:r>
-            <a:endParaRPr lang="en-US" dirty="0" smtClean="0"/>
+              <a:t>​CONTROL​ ​FLOW,​ ​FUNCTIONS </a:t>
+            </a:r>
           </a:p>
           <a:p>
             <a:r>
               <a:rPr lang="en-US" dirty="0" smtClean="0"/>
               <a:t>UNIT​ ​IV​ </a:t>
             </a:r>
-            <a:endParaRPr lang="en-US" dirty="0" smtClean="0"/>
           </a:p>
           <a:p>
             <a:pPr lvl="1"/>
             <a:r>
               <a:rPr lang="en-US" dirty="0" smtClean="0"/>
-              <a:t>​</a:t>
-            </a:r>
-            <a:r>
-              <a:rPr lang="en-US" dirty="0" smtClean="0"/>
-              <a:t>LISTS,​ ​TUPLES,​ ​</a:t>
-            </a:r>
-            <a:r>
-              <a:rPr lang="en-US" dirty="0" smtClean="0"/>
-              <a:t>DICTIONARIES</a:t>
+              <a:t>​LISTS,​ ​TUPLES,​ ​DICTIONARIES</a:t>
             </a:r>
           </a:p>
           <a:p>
@@ -4946,17 +4934,12 @@
               <a:rPr lang="fr-FR" dirty="0" smtClean="0"/>
               <a:t>UNIT​ ​V​ </a:t>
             </a:r>
-            <a:endParaRPr lang="fr-FR" dirty="0" smtClean="0"/>
           </a:p>
           <a:p>
             <a:pPr lvl="1"/>
             <a:r>
               <a:rPr lang="fr-FR" dirty="0" smtClean="0"/>
-              <a:t>​</a:t>
-            </a:r>
-            <a:r>
-              <a:rPr lang="fr-FR" dirty="0" smtClean="0"/>
-              <a:t>FILES,​ ​MODULES,​ ​PACKAGES </a:t>
+              <a:t>​FILES,​ ​MODULES,​ ​PACKAGES </a:t>
             </a:r>
             <a:endParaRPr lang="en-US" dirty="0"/>
           </a:p>
@@ -6804,15 +6787,7 @@
           <a:p>
             <a:r>
               <a:rPr lang="en-US" dirty="0" smtClean="0"/>
-              <a:t>A </a:t>
-            </a:r>
-            <a:r>
-              <a:rPr lang="en-US" dirty="0" smtClean="0"/>
-              <a:t>fixed, step-by-step sequence of activities or course of action (with definite start and end points) that must be followed in the same order to correctly perform a </a:t>
-            </a:r>
-            <a:r>
-              <a:rPr lang="en-US" dirty="0" smtClean="0"/>
-              <a:t>task.</a:t>
+              <a:t>A fixed, step-by-step sequence of activities or course of action (with definite start and end points) that must be followed in the same order to correctly perform a task.</a:t>
             </a:r>
           </a:p>
           <a:p>

</xml_diff>

<commit_message>
Last Update 03-09-2018 16:24:03.17
</commit_message>
<xml_diff>
--- a/Slides/Unit 1/GE8151-U1-1-Algorithms.pptx
+++ b/Slides/Unit 1/GE8151-U1-1-Algorithms.pptx
@@ -3809,12 +3809,12 @@
               <a:t>Algorithms are </a:t>
             </a:r>
             <a:r>
-              <a:rPr lang="en-IN" dirty="0" err="1" smtClean="0"/>
-              <a:t>reuseable</a:t>
-            </a:r>
-            <a:r>
               <a:rPr lang="en-IN" dirty="0" smtClean="0"/>
-              <a:t> in many situations.</a:t>
+              <a:t>reusable </a:t>
+            </a:r>
+            <a:r>
+              <a:rPr lang="en-IN" dirty="0" smtClean="0"/>
+              <a:t>in many situations.</a:t>
             </a:r>
           </a:p>
         </p:txBody>
@@ -4400,11 +4400,7 @@
             <a:pPr lvl="1"/>
             <a:r>
               <a:rPr lang="en-IN" dirty="0" smtClean="0"/>
-              <a:t>Finding square of an number</a:t>
-            </a:r>
-            <a:r>
-              <a:rPr lang="en-IN" dirty="0" smtClean="0"/>
-              <a:t>.</a:t>
+              <a:t>Finding square of an number.</a:t>
             </a:r>
           </a:p>
           <a:p>
@@ -5006,7 +5002,7 @@
         <p:spPr/>
         <p:txBody>
           <a:bodyPr>
-            <a:normAutofit fontScale="92500" lnSpcReduction="20000"/>
+            <a:normAutofit fontScale="85000" lnSpcReduction="20000"/>
           </a:bodyPr>
           <a:lstStyle/>
           <a:p>
@@ -5060,15 +5056,48 @@
             <a:pPr lvl="1"/>
             <a:r>
               <a:rPr lang="en-IN" dirty="0" smtClean="0"/>
-              <a:t>Test for results.</a:t>
+              <a:t>Test </a:t>
+            </a:r>
+            <a:r>
+              <a:rPr lang="en-IN" dirty="0" smtClean="0"/>
+              <a:t>the</a:t>
+            </a:r>
+            <a:r>
+              <a:rPr lang="en-IN" dirty="0" smtClean="0"/>
+              <a:t> </a:t>
+            </a:r>
+            <a:r>
+              <a:rPr lang="en-IN" dirty="0" smtClean="0"/>
+              <a:t>results.</a:t>
             </a:r>
           </a:p>
           <a:p>
             <a:pPr lvl="2"/>
             <a:r>
               <a:rPr lang="en-IN" dirty="0" smtClean="0"/>
-              <a:t>If it is solved then try to improve for other situation.</a:t>
-            </a:r>
+              <a:t>If </a:t>
+            </a:r>
+            <a:r>
+              <a:rPr lang="en-IN" dirty="0" smtClean="0"/>
+              <a:t> </a:t>
+            </a:r>
+            <a:r>
+              <a:rPr lang="en-IN" dirty="0" smtClean="0"/>
+              <a:t>algorithm </a:t>
+            </a:r>
+            <a:r>
+              <a:rPr lang="en-IN" dirty="0" smtClean="0"/>
+              <a:t>is solving our problem then </a:t>
+            </a:r>
+            <a:r>
+              <a:rPr lang="en-IN" dirty="0" smtClean="0"/>
+              <a:t>try to improve for other </a:t>
+            </a:r>
+            <a:r>
+              <a:rPr lang="en-IN" dirty="0" smtClean="0"/>
+              <a:t>all situations.</a:t>
+            </a:r>
+            <a:endParaRPr lang="en-IN" dirty="0" smtClean="0"/>
           </a:p>
           <a:p>
             <a:pPr lvl="2"/>

</xml_diff>

<commit_message>
Last Update 04-09-2018 10:55:13.24
</commit_message>
<xml_diff>
--- a/Slides/Unit 1/GE8151-U1-1-Algorithms.pptx
+++ b/Slides/Unit 1/GE8151-U1-1-Algorithms.pptx
@@ -208,7 +208,7 @@
             <a:fld id="{9515075B-F3F0-4441-A1BD-B7B515B708FF}" type="datetimeFigureOut">
               <a:rPr lang="en-US" smtClean="0"/>
               <a:pPr/>
-              <a:t>9/3/2018</a:t>
+              <a:t>9/4/2018</a:t>
             </a:fld>
             <a:endParaRPr lang="en-US"/>
           </a:p>
@@ -675,7 +675,7 @@
             <a:fld id="{6E658DF8-B8C0-4C7F-85EB-B53A2DDD44A9}" type="datetimeFigureOut">
               <a:rPr lang="en-US" smtClean="0"/>
               <a:pPr/>
-              <a:t>9/3/2018</a:t>
+              <a:t>9/4/2018</a:t>
             </a:fld>
             <a:endParaRPr lang="en-US"/>
           </a:p>
@@ -842,7 +842,7 @@
             <a:fld id="{6E658DF8-B8C0-4C7F-85EB-B53A2DDD44A9}" type="datetimeFigureOut">
               <a:rPr lang="en-US" smtClean="0"/>
               <a:pPr/>
-              <a:t>9/3/2018</a:t>
+              <a:t>9/4/2018</a:t>
             </a:fld>
             <a:endParaRPr lang="en-US"/>
           </a:p>
@@ -1019,7 +1019,7 @@
             <a:fld id="{6E658DF8-B8C0-4C7F-85EB-B53A2DDD44A9}" type="datetimeFigureOut">
               <a:rPr lang="en-US" smtClean="0"/>
               <a:pPr/>
-              <a:t>9/3/2018</a:t>
+              <a:t>9/4/2018</a:t>
             </a:fld>
             <a:endParaRPr lang="en-US"/>
           </a:p>
@@ -1218,7 +1218,7 @@
             <a:fld id="{6E658DF8-B8C0-4C7F-85EB-B53A2DDD44A9}" type="datetimeFigureOut">
               <a:rPr lang="en-US" smtClean="0"/>
               <a:pPr/>
-              <a:t>9/3/2018</a:t>
+              <a:t>9/4/2018</a:t>
             </a:fld>
             <a:endParaRPr lang="en-US"/>
           </a:p>
@@ -1461,7 +1461,7 @@
             <a:fld id="{6E658DF8-B8C0-4C7F-85EB-B53A2DDD44A9}" type="datetimeFigureOut">
               <a:rPr lang="en-US" smtClean="0"/>
               <a:pPr/>
-              <a:t>9/3/2018</a:t>
+              <a:t>9/4/2018</a:t>
             </a:fld>
             <a:endParaRPr lang="en-US"/>
           </a:p>
@@ -1746,7 +1746,7 @@
             <a:fld id="{6E658DF8-B8C0-4C7F-85EB-B53A2DDD44A9}" type="datetimeFigureOut">
               <a:rPr lang="en-US" smtClean="0"/>
               <a:pPr/>
-              <a:t>9/3/2018</a:t>
+              <a:t>9/4/2018</a:t>
             </a:fld>
             <a:endParaRPr lang="en-US"/>
           </a:p>
@@ -2165,7 +2165,7 @@
             <a:fld id="{6E658DF8-B8C0-4C7F-85EB-B53A2DDD44A9}" type="datetimeFigureOut">
               <a:rPr lang="en-US" smtClean="0"/>
               <a:pPr/>
-              <a:t>9/3/2018</a:t>
+              <a:t>9/4/2018</a:t>
             </a:fld>
             <a:endParaRPr lang="en-US"/>
           </a:p>
@@ -2280,7 +2280,7 @@
             <a:fld id="{6E658DF8-B8C0-4C7F-85EB-B53A2DDD44A9}" type="datetimeFigureOut">
               <a:rPr lang="en-US" smtClean="0"/>
               <a:pPr/>
-              <a:t>9/3/2018</a:t>
+              <a:t>9/4/2018</a:t>
             </a:fld>
             <a:endParaRPr lang="en-US"/>
           </a:p>
@@ -2372,7 +2372,7 @@
             <a:fld id="{6E658DF8-B8C0-4C7F-85EB-B53A2DDD44A9}" type="datetimeFigureOut">
               <a:rPr lang="en-US" smtClean="0"/>
               <a:pPr/>
-              <a:t>9/3/2018</a:t>
+              <a:t>9/4/2018</a:t>
             </a:fld>
             <a:endParaRPr lang="en-US"/>
           </a:p>
@@ -2646,7 +2646,7 @@
             <a:fld id="{6E658DF8-B8C0-4C7F-85EB-B53A2DDD44A9}" type="datetimeFigureOut">
               <a:rPr lang="en-US" smtClean="0"/>
               <a:pPr/>
-              <a:t>9/3/2018</a:t>
+              <a:t>9/4/2018</a:t>
             </a:fld>
             <a:endParaRPr lang="en-US"/>
           </a:p>
@@ -2900,7 +2900,7 @@
             <a:fld id="{6E658DF8-B8C0-4C7F-85EB-B53A2DDD44A9}" type="datetimeFigureOut">
               <a:rPr lang="en-US" smtClean="0"/>
               <a:pPr/>
-              <a:t>9/3/2018</a:t>
+              <a:t>9/4/2018</a:t>
             </a:fld>
             <a:endParaRPr lang="en-US"/>
           </a:p>
@@ -3122,7 +3122,7 @@
             <a:fld id="{6E658DF8-B8C0-4C7F-85EB-B53A2DDD44A9}" type="datetimeFigureOut">
               <a:rPr lang="en-US" smtClean="0"/>
               <a:pPr/>
-              <a:t>9/3/2018</a:t>
+              <a:t>9/4/2018</a:t>
             </a:fld>
             <a:endParaRPr lang="en-US"/>
           </a:p>
@@ -3758,7 +3758,7 @@
           <a:lstStyle/>
           <a:p>
             <a:r>
-              <a:rPr lang="en-IN" dirty="0" smtClean="0"/>
+              <a:rPr lang="en-IN" b="1" dirty="0" smtClean="0"/>
               <a:t>Efficiency</a:t>
             </a:r>
           </a:p>
@@ -3778,8 +3778,8 @@
           </a:p>
           <a:p>
             <a:r>
-              <a:rPr lang="en-IN" dirty="0" smtClean="0"/>
-              <a:t>   Abstraction</a:t>
+              <a:rPr lang="en-IN" b="1" dirty="0" smtClean="0"/>
+              <a:t>Abstraction</a:t>
             </a:r>
           </a:p>
           <a:p>
@@ -3798,23 +3798,15 @@
           </a:p>
           <a:p>
             <a:r>
+              <a:rPr lang="en-IN" b="1" dirty="0" smtClean="0"/>
+              <a:t>Reusability</a:t>
+            </a:r>
+          </a:p>
+          <a:p>
+            <a:pPr lvl="1"/>
+            <a:r>
               <a:rPr lang="en-IN" dirty="0" smtClean="0"/>
-              <a:t>Reusability</a:t>
-            </a:r>
-          </a:p>
-          <a:p>
-            <a:pPr lvl="1"/>
-            <a:r>
-              <a:rPr lang="en-IN" dirty="0" smtClean="0"/>
-              <a:t>Algorithms are </a:t>
-            </a:r>
-            <a:r>
-              <a:rPr lang="en-IN" dirty="0" smtClean="0"/>
-              <a:t>reusable </a:t>
-            </a:r>
-            <a:r>
-              <a:rPr lang="en-IN" dirty="0" smtClean="0"/>
-              <a:t>in many situations.</a:t>
+              <a:t>Algorithms are reusable in many situations.</a:t>
             </a:r>
           </a:p>
         </p:txBody>
@@ -4097,7 +4089,7 @@
             </a:r>
             <a:r>
               <a:rPr lang="en-IN" i="1" dirty="0" smtClean="0"/>
-              <a:t>Read two number inputs A and B from     user.</a:t>
+              <a:t>Read two number inputs Number1 and Number2 from user.</a:t>
             </a:r>
           </a:p>
           <a:p>
@@ -4110,7 +4102,7 @@
             </a:r>
             <a:r>
               <a:rPr lang="en-IN" i="1" dirty="0" smtClean="0"/>
-              <a:t>Compute A + B and store the result in C</a:t>
+              <a:t>Compute Addition of Number1 and Number2 and store it in Results</a:t>
             </a:r>
           </a:p>
           <a:p>
@@ -4123,7 +4115,7 @@
             </a:r>
             <a:r>
               <a:rPr lang="en-IN" i="1" dirty="0" smtClean="0"/>
-              <a:t>Display C as result</a:t>
+              <a:t>Display Results</a:t>
             </a:r>
           </a:p>
           <a:p>
@@ -4400,35 +4392,19 @@
             <a:pPr lvl="1"/>
             <a:r>
               <a:rPr lang="en-IN" dirty="0" smtClean="0"/>
+              <a:t>Finding the average </a:t>
+            </a:r>
+            <a:r>
+              <a:rPr lang="en-IN" smtClean="0"/>
+              <a:t>of 3 marks.</a:t>
+            </a:r>
+            <a:endParaRPr lang="en-IN" dirty="0" smtClean="0"/>
+          </a:p>
+          <a:p>
+            <a:pPr lvl="1"/>
+            <a:r>
+              <a:rPr lang="en-IN" dirty="0" smtClean="0"/>
               <a:t>Finding square of an number.</a:t>
-            </a:r>
-          </a:p>
-          <a:p>
-            <a:pPr lvl="1"/>
-            <a:r>
-              <a:rPr lang="en-IN" dirty="0" smtClean="0"/>
-              <a:t>To find greatest among 2 numbers.</a:t>
-            </a:r>
-          </a:p>
-          <a:p>
-            <a:pPr lvl="1"/>
-            <a:r>
-              <a:rPr lang="en-IN" dirty="0" smtClean="0"/>
-              <a:t>To find greatest among 3 numbers.</a:t>
-            </a:r>
-          </a:p>
-          <a:p>
-            <a:pPr lvl="1"/>
-            <a:r>
-              <a:rPr lang="en-IN" dirty="0" smtClean="0"/>
-              <a:t>Print number from 1 to 5.</a:t>
-            </a:r>
-          </a:p>
-          <a:p>
-            <a:pPr lvl="1"/>
-            <a:r>
-              <a:rPr lang="en-IN" dirty="0" smtClean="0"/>
-              <a:t>Sum of a numbers from 1 to limit given by user.</a:t>
             </a:r>
           </a:p>
         </p:txBody>
@@ -5056,48 +5032,15 @@
             <a:pPr lvl="1"/>
             <a:r>
               <a:rPr lang="en-IN" dirty="0" smtClean="0"/>
-              <a:t>Test </a:t>
-            </a:r>
+              <a:t>Test the results.</a:t>
+            </a:r>
+          </a:p>
+          <a:p>
+            <a:pPr lvl="2"/>
             <a:r>
               <a:rPr lang="en-IN" dirty="0" smtClean="0"/>
-              <a:t>the</a:t>
-            </a:r>
-            <a:r>
-              <a:rPr lang="en-IN" dirty="0" smtClean="0"/>
-              <a:t> </a:t>
-            </a:r>
-            <a:r>
-              <a:rPr lang="en-IN" dirty="0" smtClean="0"/>
-              <a:t>results.</a:t>
-            </a:r>
-          </a:p>
-          <a:p>
-            <a:pPr lvl="2"/>
-            <a:r>
-              <a:rPr lang="en-IN" dirty="0" smtClean="0"/>
-              <a:t>If </a:t>
-            </a:r>
-            <a:r>
-              <a:rPr lang="en-IN" dirty="0" smtClean="0"/>
-              <a:t> </a:t>
-            </a:r>
-            <a:r>
-              <a:rPr lang="en-IN" dirty="0" smtClean="0"/>
-              <a:t>algorithm </a:t>
-            </a:r>
-            <a:r>
-              <a:rPr lang="en-IN" dirty="0" smtClean="0"/>
-              <a:t>is solving our problem then </a:t>
-            </a:r>
-            <a:r>
-              <a:rPr lang="en-IN" dirty="0" smtClean="0"/>
-              <a:t>try to improve for other </a:t>
-            </a:r>
-            <a:r>
-              <a:rPr lang="en-IN" dirty="0" smtClean="0"/>
-              <a:t>all situations.</a:t>
-            </a:r>
-            <a:endParaRPr lang="en-IN" dirty="0" smtClean="0"/>
+              <a:t>If  algorithm is solving our problem then try to improve for other all situations.</a:t>
+            </a:r>
           </a:p>
           <a:p>
             <a:pPr lvl="2"/>
@@ -7006,40 +6949,40 @@
           <a:lstStyle/>
           <a:p>
             <a:r>
+              <a:rPr lang="en-IN" b="1" dirty="0" smtClean="0"/>
+              <a:t>Finite</a:t>
+            </a:r>
+          </a:p>
+          <a:p>
+            <a:pPr lvl="1"/>
+            <a:r>
               <a:rPr lang="en-IN" dirty="0" smtClean="0"/>
-              <a:t>Finite</a:t>
+              <a:t>It should able to eventually solve the problem.</a:t>
+            </a:r>
+          </a:p>
+          <a:p>
+            <a:r>
+              <a:rPr lang="en-IN" b="1" dirty="0" smtClean="0"/>
+              <a:t>Well Defined</a:t>
             </a:r>
           </a:p>
           <a:p>
             <a:pPr lvl="1"/>
             <a:r>
               <a:rPr lang="en-IN" dirty="0" smtClean="0"/>
-              <a:t>It should eventually able to solve the problem.</a:t>
-            </a:r>
-          </a:p>
-          <a:p>
+              <a:t>Steps in the algorithm should be precise and well defined. </a:t>
+            </a:r>
+          </a:p>
+          <a:p>
+            <a:pPr lvl="1"/>
             <a:r>
               <a:rPr lang="en-IN" dirty="0" smtClean="0"/>
-              <a:t>Well Defined</a:t>
-            </a:r>
-          </a:p>
-          <a:p>
-            <a:pPr lvl="1"/>
-            <a:r>
-              <a:rPr lang="en-IN" dirty="0" smtClean="0"/>
-              <a:t>Step in the algorithm should be precise and well defined. </a:t>
-            </a:r>
-          </a:p>
-          <a:p>
-            <a:pPr lvl="1"/>
-            <a:r>
-              <a:rPr lang="en-IN" dirty="0" smtClean="0"/>
-              <a:t>Computer must understand the steps.</a:t>
-            </a:r>
-          </a:p>
-          <a:p>
-            <a:r>
-              <a:rPr lang="en-IN" dirty="0" smtClean="0"/>
+              <a:t>Computer must able to understand the steps.</a:t>
+            </a:r>
+          </a:p>
+          <a:p>
+            <a:r>
+              <a:rPr lang="en-IN" b="1" dirty="0" smtClean="0"/>
               <a:t>Effective</a:t>
             </a:r>
           </a:p>

</xml_diff>